<commit_message>
Added sample sql database
</commit_message>
<xml_diff>
--- a/Presentation.pptx
+++ b/Presentation.pptx
@@ -2,16 +2,18 @@
 <file path=ppt/presentation.xml><?xml version="1.0" encoding="utf-8"?>
 <p:presentation xmlns:a="http://schemas.openxmlformats.org/drawingml/2006/main" xmlns:r="http://schemas.openxmlformats.org/officeDocument/2006/relationships" xmlns:p="http://schemas.openxmlformats.org/presentationml/2006/main" saveSubsetFonts="1">
   <p:sldMasterIdLst>
-    <p:sldMasterId id="2147483732" r:id="rId1"/>
+    <p:sldMasterId id="2147483840" r:id="rId1"/>
   </p:sldMasterIdLst>
   <p:sldIdLst>
     <p:sldId id="256" r:id="rId2"/>
     <p:sldId id="257" r:id="rId3"/>
-    <p:sldId id="259" r:id="rId4"/>
-    <p:sldId id="260" r:id="rId5"/>
-    <p:sldId id="261" r:id="rId6"/>
+    <p:sldId id="260" r:id="rId4"/>
+    <p:sldId id="261" r:id="rId5"/>
+    <p:sldId id="259" r:id="rId6"/>
     <p:sldId id="262" r:id="rId7"/>
-    <p:sldId id="258" r:id="rId8"/>
+    <p:sldId id="263" r:id="rId8"/>
+    <p:sldId id="264" r:id="rId9"/>
+    <p:sldId id="258" r:id="rId10"/>
   </p:sldIdLst>
   <p:sldSz cx="12192000" cy="6858000"/>
   <p:notesSz cx="6858000" cy="9144000"/>
@@ -382,7 +384,7 @@
     </p:spTree>
     <p:extLst>
       <p:ext uri="{BB962C8B-B14F-4D97-AF65-F5344CB8AC3E}">
-        <p14:creationId xmlns:p14="http://schemas.microsoft.com/office/powerpoint/2010/main" val="2529284004"/>
+        <p14:creationId xmlns:p14="http://schemas.microsoft.com/office/powerpoint/2010/main" val="2636220699"/>
       </p:ext>
     </p:extLst>
   </p:cSld>
@@ -673,7 +675,7 @@
     </p:spTree>
     <p:extLst>
       <p:ext uri="{BB962C8B-B14F-4D97-AF65-F5344CB8AC3E}">
-        <p14:creationId xmlns:p14="http://schemas.microsoft.com/office/powerpoint/2010/main" val="2854268789"/>
+        <p14:creationId xmlns:p14="http://schemas.microsoft.com/office/powerpoint/2010/main" val="4232676272"/>
       </p:ext>
     </p:extLst>
   </p:cSld>
@@ -932,7 +934,7 @@
     </p:spTree>
     <p:extLst>
       <p:ext uri="{BB962C8B-B14F-4D97-AF65-F5344CB8AC3E}">
-        <p14:creationId xmlns:p14="http://schemas.microsoft.com/office/powerpoint/2010/main" val="343169880"/>
+        <p14:creationId xmlns:p14="http://schemas.microsoft.com/office/powerpoint/2010/main" val="517262984"/>
       </p:ext>
     </p:extLst>
   </p:cSld>
@@ -1401,7 +1403,7 @@
     </p:spTree>
     <p:extLst>
       <p:ext uri="{BB962C8B-B14F-4D97-AF65-F5344CB8AC3E}">
-        <p14:creationId xmlns:p14="http://schemas.microsoft.com/office/powerpoint/2010/main" val="1672897219"/>
+        <p14:creationId xmlns:p14="http://schemas.microsoft.com/office/powerpoint/2010/main" val="2821868995"/>
       </p:ext>
     </p:extLst>
   </p:cSld>
@@ -1581,7 +1583,7 @@
     </p:spTree>
     <p:extLst>
       <p:ext uri="{BB962C8B-B14F-4D97-AF65-F5344CB8AC3E}">
-        <p14:creationId xmlns:p14="http://schemas.microsoft.com/office/powerpoint/2010/main" val="3927618186"/>
+        <p14:creationId xmlns:p14="http://schemas.microsoft.com/office/powerpoint/2010/main" val="1188407946"/>
       </p:ext>
     </p:extLst>
   </p:cSld>
@@ -2157,7 +2159,7 @@
     </p:spTree>
     <p:extLst>
       <p:ext uri="{BB962C8B-B14F-4D97-AF65-F5344CB8AC3E}">
-        <p14:creationId xmlns:p14="http://schemas.microsoft.com/office/powerpoint/2010/main" val="1387384725"/>
+        <p14:creationId xmlns:p14="http://schemas.microsoft.com/office/powerpoint/2010/main" val="242802483"/>
       </p:ext>
     </p:extLst>
   </p:cSld>
@@ -2489,7 +2491,7 @@
     </p:spTree>
     <p:extLst>
       <p:ext uri="{BB962C8B-B14F-4D97-AF65-F5344CB8AC3E}">
-        <p14:creationId xmlns:p14="http://schemas.microsoft.com/office/powerpoint/2010/main" val="2403100402"/>
+        <p14:creationId xmlns:p14="http://schemas.microsoft.com/office/powerpoint/2010/main" val="203264931"/>
       </p:ext>
     </p:extLst>
   </p:cSld>
@@ -2664,7 +2666,7 @@
     </p:spTree>
     <p:extLst>
       <p:ext uri="{BB962C8B-B14F-4D97-AF65-F5344CB8AC3E}">
-        <p14:creationId xmlns:p14="http://schemas.microsoft.com/office/powerpoint/2010/main" val="2061931937"/>
+        <p14:creationId xmlns:p14="http://schemas.microsoft.com/office/powerpoint/2010/main" val="2110011861"/>
       </p:ext>
     </p:extLst>
   </p:cSld>
@@ -2844,7 +2846,7 @@
     </p:spTree>
     <p:extLst>
       <p:ext uri="{BB962C8B-B14F-4D97-AF65-F5344CB8AC3E}">
-        <p14:creationId xmlns:p14="http://schemas.microsoft.com/office/powerpoint/2010/main" val="214953894"/>
+        <p14:creationId xmlns:p14="http://schemas.microsoft.com/office/powerpoint/2010/main" val="4161520161"/>
       </p:ext>
     </p:extLst>
   </p:cSld>
@@ -3014,7 +3016,7 @@
     </p:spTree>
     <p:extLst>
       <p:ext uri="{BB962C8B-B14F-4D97-AF65-F5344CB8AC3E}">
-        <p14:creationId xmlns:p14="http://schemas.microsoft.com/office/powerpoint/2010/main" val="396984250"/>
+        <p14:creationId xmlns:p14="http://schemas.microsoft.com/office/powerpoint/2010/main" val="4026435859"/>
       </p:ext>
     </p:extLst>
   </p:cSld>
@@ -3271,7 +3273,7 @@
     </p:spTree>
     <p:extLst>
       <p:ext uri="{BB962C8B-B14F-4D97-AF65-F5344CB8AC3E}">
-        <p14:creationId xmlns:p14="http://schemas.microsoft.com/office/powerpoint/2010/main" val="1730222350"/>
+        <p14:creationId xmlns:p14="http://schemas.microsoft.com/office/powerpoint/2010/main" val="1090564263"/>
       </p:ext>
     </p:extLst>
   </p:cSld>
@@ -3563,7 +3565,7 @@
     </p:spTree>
     <p:extLst>
       <p:ext uri="{BB962C8B-B14F-4D97-AF65-F5344CB8AC3E}">
-        <p14:creationId xmlns:p14="http://schemas.microsoft.com/office/powerpoint/2010/main" val="2592724644"/>
+        <p14:creationId xmlns:p14="http://schemas.microsoft.com/office/powerpoint/2010/main" val="4073562501"/>
       </p:ext>
     </p:extLst>
   </p:cSld>
@@ -3993,7 +3995,7 @@
     </p:spTree>
     <p:extLst>
       <p:ext uri="{BB962C8B-B14F-4D97-AF65-F5344CB8AC3E}">
-        <p14:creationId xmlns:p14="http://schemas.microsoft.com/office/powerpoint/2010/main" val="2852115537"/>
+        <p14:creationId xmlns:p14="http://schemas.microsoft.com/office/powerpoint/2010/main" val="542833811"/>
       </p:ext>
     </p:extLst>
   </p:cSld>
@@ -4111,7 +4113,7 @@
     </p:spTree>
     <p:extLst>
       <p:ext uri="{BB962C8B-B14F-4D97-AF65-F5344CB8AC3E}">
-        <p14:creationId xmlns:p14="http://schemas.microsoft.com/office/powerpoint/2010/main" val="1203498958"/>
+        <p14:creationId xmlns:p14="http://schemas.microsoft.com/office/powerpoint/2010/main" val="2982237264"/>
       </p:ext>
     </p:extLst>
   </p:cSld>
@@ -4206,7 +4208,7 @@
     </p:spTree>
     <p:extLst>
       <p:ext uri="{BB962C8B-B14F-4D97-AF65-F5344CB8AC3E}">
-        <p14:creationId xmlns:p14="http://schemas.microsoft.com/office/powerpoint/2010/main" val="1626152336"/>
+        <p14:creationId xmlns:p14="http://schemas.microsoft.com/office/powerpoint/2010/main" val="897662612"/>
       </p:ext>
     </p:extLst>
   </p:cSld>
@@ -4489,7 +4491,7 @@
     </p:spTree>
     <p:extLst>
       <p:ext uri="{BB962C8B-B14F-4D97-AF65-F5344CB8AC3E}">
-        <p14:creationId xmlns:p14="http://schemas.microsoft.com/office/powerpoint/2010/main" val="3533548742"/>
+        <p14:creationId xmlns:p14="http://schemas.microsoft.com/office/powerpoint/2010/main" val="4151468957"/>
       </p:ext>
     </p:extLst>
   </p:cSld>
@@ -4790,7 +4792,7 @@
     </p:spTree>
     <p:extLst>
       <p:ext uri="{BB962C8B-B14F-4D97-AF65-F5344CB8AC3E}">
-        <p14:creationId xmlns:p14="http://schemas.microsoft.com/office/powerpoint/2010/main" val="297581276"/>
+        <p14:creationId xmlns:p14="http://schemas.microsoft.com/office/powerpoint/2010/main" val="741872259"/>
       </p:ext>
     </p:extLst>
   </p:cSld>
@@ -5063,29 +5065,29 @@
     </p:spTree>
     <p:extLst>
       <p:ext uri="{BB962C8B-B14F-4D97-AF65-F5344CB8AC3E}">
-        <p14:creationId xmlns:p14="http://schemas.microsoft.com/office/powerpoint/2010/main" val="1647884671"/>
+        <p14:creationId xmlns:p14="http://schemas.microsoft.com/office/powerpoint/2010/main" val="849747048"/>
       </p:ext>
     </p:extLst>
   </p:cSld>
   <p:clrMap bg1="dk1" tx1="lt1" bg2="dk2" tx2="lt2" accent1="accent1" accent2="accent2" accent3="accent3" accent4="accent4" accent5="accent5" accent6="accent6" hlink="hlink" folHlink="folHlink"/>
   <p:sldLayoutIdLst>
-    <p:sldLayoutId id="2147483733" r:id="rId1"/>
-    <p:sldLayoutId id="2147483734" r:id="rId2"/>
-    <p:sldLayoutId id="2147483735" r:id="rId3"/>
-    <p:sldLayoutId id="2147483736" r:id="rId4"/>
-    <p:sldLayoutId id="2147483737" r:id="rId5"/>
-    <p:sldLayoutId id="2147483738" r:id="rId6"/>
-    <p:sldLayoutId id="2147483739" r:id="rId7"/>
-    <p:sldLayoutId id="2147483740" r:id="rId8"/>
-    <p:sldLayoutId id="2147483741" r:id="rId9"/>
-    <p:sldLayoutId id="2147483742" r:id="rId10"/>
-    <p:sldLayoutId id="2147483743" r:id="rId11"/>
-    <p:sldLayoutId id="2147483744" r:id="rId12"/>
-    <p:sldLayoutId id="2147483745" r:id="rId13"/>
-    <p:sldLayoutId id="2147483746" r:id="rId14"/>
-    <p:sldLayoutId id="2147483747" r:id="rId15"/>
-    <p:sldLayoutId id="2147483748" r:id="rId16"/>
-    <p:sldLayoutId id="2147483749" r:id="rId17"/>
+    <p:sldLayoutId id="2147483841" r:id="rId1"/>
+    <p:sldLayoutId id="2147483842" r:id="rId2"/>
+    <p:sldLayoutId id="2147483843" r:id="rId3"/>
+    <p:sldLayoutId id="2147483844" r:id="rId4"/>
+    <p:sldLayoutId id="2147483845" r:id="rId5"/>
+    <p:sldLayoutId id="2147483846" r:id="rId6"/>
+    <p:sldLayoutId id="2147483847" r:id="rId7"/>
+    <p:sldLayoutId id="2147483848" r:id="rId8"/>
+    <p:sldLayoutId id="2147483849" r:id="rId9"/>
+    <p:sldLayoutId id="2147483850" r:id="rId10"/>
+    <p:sldLayoutId id="2147483851" r:id="rId11"/>
+    <p:sldLayoutId id="2147483852" r:id="rId12"/>
+    <p:sldLayoutId id="2147483853" r:id="rId13"/>
+    <p:sldLayoutId id="2147483854" r:id="rId14"/>
+    <p:sldLayoutId id="2147483855" r:id="rId15"/>
+    <p:sldLayoutId id="2147483856" r:id="rId16"/>
+    <p:sldLayoutId id="2147483857" r:id="rId17"/>
   </p:sldLayoutIdLst>
   <p:txStyles>
     <p:titleStyle>
@@ -5741,7 +5743,9 @@
         </p:nvSpPr>
         <p:spPr/>
         <p:txBody>
-          <a:bodyPr/>
+          <a:bodyPr>
+            <a:normAutofit/>
+          </a:bodyPr>
           <a:lstStyle/>
           <a:p>
             <a:r>
@@ -5776,7 +5780,9 @@
         </p:nvSpPr>
         <p:spPr/>
         <p:txBody>
-          <a:bodyPr/>
+          <a:bodyPr>
+            <a:normAutofit/>
+          </a:bodyPr>
           <a:lstStyle/>
           <a:p>
             <a:r>
@@ -5795,7 +5801,20 @@
             </a:r>
             <a:r>
               <a:rPr lang="en-US" dirty="0" smtClean="0"/>
-              <a:t>, 2018</a:t>
+              <a:t>, </a:t>
+            </a:r>
+            <a:r>
+              <a:rPr lang="en-US" dirty="0" smtClean="0"/>
+              <a:t>2018</a:t>
+            </a:r>
+          </a:p>
+          <a:p>
+            <a:endParaRPr lang="en-US" dirty="0"/>
+          </a:p>
+          <a:p>
+            <a:r>
+              <a:rPr lang="en-US" dirty="0" smtClean="0"/>
+              <a:t>Alan Wilson</a:t>
             </a:r>
             <a:endParaRPr lang="en-US" dirty="0"/>
           </a:p>
@@ -5811,12 +5830,16 @@
   <p:clrMapOvr>
     <a:masterClrMapping/>
   </p:clrMapOvr>
-  <mc:AlternateContent xmlns:mc="http://schemas.openxmlformats.org/markup-compatibility/2006" xmlns:p14="http://schemas.microsoft.com/office/powerpoint/2010/main">
-    <mc:Choice Requires="p14">
-      <p:transition p14:dur="0"/>
+  <mc:AlternateContent xmlns:mc="http://schemas.openxmlformats.org/markup-compatibility/2006">
+    <mc:Choice xmlns:p14="http://schemas.microsoft.com/office/powerpoint/2010/main" Requires="p14">
+      <p:transition spd="slow" p14:dur="800">
+        <p:circle/>
+      </p:transition>
     </mc:Choice>
-    <mc:Fallback xmlns="">
-      <p:transition/>
+    <mc:Fallback>
+      <p:transition spd="slow">
+        <p:circle/>
+      </p:transition>
     </mc:Fallback>
   </mc:AlternateContent>
   <p:timing>
@@ -5861,15 +5884,12 @@
           <a:bodyPr/>
           <a:lstStyle/>
           <a:p>
-            <a:r>
-              <a:rPr lang="en-US" dirty="0" smtClean="0"/>
-              <a:t>What we are going to cover </a:t>
-            </a:r>
-            <a:r>
-              <a:rPr lang="en-US" dirty="0" smtClean="0"/>
-              <a:t>tonight:</a:t>
-            </a:r>
-            <a:endParaRPr lang="en-US" dirty="0"/>
+            <a:pPr algn="ctr"/>
+            <a:r>
+              <a:rPr lang="en-US" b="1" dirty="0" smtClean="0"/>
+              <a:t>What we are going to cover tonight:</a:t>
+            </a:r>
+            <a:endParaRPr lang="en-US" b="1" dirty="0"/>
           </a:p>
         </p:txBody>
       </p:sp>
@@ -5969,81 +5989,6 @@
 </file>
 
 <file path=ppt/slides/slide3.xml><?xml version="1.0" encoding="utf-8"?>
-<p:sld xmlns:a="http://schemas.openxmlformats.org/drawingml/2006/main" xmlns:r="http://schemas.openxmlformats.org/officeDocument/2006/relationships" xmlns:p="http://schemas.openxmlformats.org/presentationml/2006/main">
-  <p:cSld>
-    <p:spTree>
-      <p:nvGrpSpPr>
-        <p:cNvPr id="1" name=""/>
-        <p:cNvGrpSpPr/>
-        <p:nvPr/>
-      </p:nvGrpSpPr>
-      <p:grpSpPr>
-        <a:xfrm>
-          <a:off x="0" y="0"/>
-          <a:ext cx="0" cy="0"/>
-          <a:chOff x="0" y="0"/>
-          <a:chExt cx="0" cy="0"/>
-        </a:xfrm>
-      </p:grpSpPr>
-      <p:sp>
-        <p:nvSpPr>
-          <p:cNvPr id="2" name="Title 1"/>
-          <p:cNvSpPr>
-            <a:spLocks noGrp="1"/>
-          </p:cNvSpPr>
-          <p:nvPr>
-            <p:ph type="title"/>
-          </p:nvPr>
-        </p:nvSpPr>
-        <p:spPr/>
-        <p:txBody>
-          <a:bodyPr/>
-          <a:lstStyle/>
-          <a:p>
-            <a:endParaRPr lang="en-US"/>
-          </a:p>
-        </p:txBody>
-      </p:sp>
-      <p:sp>
-        <p:nvSpPr>
-          <p:cNvPr id="3" name="Content Placeholder 2"/>
-          <p:cNvSpPr>
-            <a:spLocks noGrp="1"/>
-          </p:cNvSpPr>
-          <p:nvPr>
-            <p:ph idx="1"/>
-          </p:nvPr>
-        </p:nvSpPr>
-        <p:spPr/>
-        <p:txBody>
-          <a:bodyPr/>
-          <a:lstStyle/>
-          <a:p>
-            <a:endParaRPr lang="en-US"/>
-          </a:p>
-        </p:txBody>
-      </p:sp>
-    </p:spTree>
-    <p:extLst>
-      <p:ext uri="{BB962C8B-B14F-4D97-AF65-F5344CB8AC3E}">
-        <p14:creationId xmlns:p14="http://schemas.microsoft.com/office/powerpoint/2010/main" val="3979627185"/>
-      </p:ext>
-    </p:extLst>
-  </p:cSld>
-  <p:clrMapOvr>
-    <a:masterClrMapping/>
-  </p:clrMapOvr>
-  <p:timing>
-    <p:tnLst>
-      <p:par>
-        <p:cTn id="1" dur="indefinite" restart="never" nodeType="tmRoot"/>
-      </p:par>
-    </p:tnLst>
-  </p:timing>
-</p:sld>
-</file>
-
-<file path=ppt/slides/slide4.xml><?xml version="1.0" encoding="utf-8"?>
 <p:sld xmlns:a="http://schemas.openxmlformats.org/drawingml/2006/main" xmlns:r="http://schemas.openxmlformats.org/officeDocument/2006/relationships" xmlns:p="http://schemas.openxmlformats.org/presentationml/2006/main">
   <p:cSld>
     <p:spTree>
@@ -6092,14 +6037,14 @@
       </p:pic>
       <p:sp>
         <p:nvSpPr>
-          <p:cNvPr id="6" name="Rectangle 5"/>
-          <p:cNvSpPr/>
+          <p:cNvPr id="2" name="TextBox 1"/>
+          <p:cNvSpPr txBox="1"/>
           <p:nvPr/>
         </p:nvSpPr>
         <p:spPr>
           <a:xfrm>
-            <a:off x="4427296" y="0"/>
-            <a:ext cx="3398367" cy="923330"/>
+            <a:off x="3509318" y="65903"/>
+            <a:ext cx="5568053" cy="923330"/>
           </a:xfrm>
           <a:prstGeom prst="rect">
             <a:avLst/>
@@ -6107,52 +6052,28 @@
           <a:noFill/>
         </p:spPr>
         <p:txBody>
-          <a:bodyPr wrap="none" lIns="91440" tIns="45720" rIns="91440" bIns="45720">
+          <a:bodyPr wrap="square" rtlCol="0">
             <a:spAutoFit/>
           </a:bodyPr>
           <a:lstStyle/>
           <a:p>
             <a:pPr algn="ctr"/>
             <a:r>
+              <a:rPr lang="en-US" sz="5400" b="1" dirty="0" smtClean="0"/>
+              <a:t>Data </a:t>
+            </a:r>
+            <a:r>
               <a:rPr lang="en-US" sz="5400" b="1" dirty="0" smtClean="0">
-                <a:ln w="9525">
-                  <a:solidFill>
-                    <a:schemeClr val="bg1"/>
-                  </a:solidFill>
-                  <a:prstDash val="solid"/>
-                </a:ln>
-                <a:solidFill>
-                  <a:schemeClr val="accent5"/>
-                </a:solidFill>
-                <a:effectLst>
-                  <a:outerShdw blurRad="12700" dist="38100" dir="2700000" algn="tl" rotWithShape="0">
-                    <a:schemeClr val="accent5">
-                      <a:lumMod val="60000"/>
-                      <a:lumOff val="40000"/>
-                    </a:schemeClr>
-                  </a:outerShdw>
-                </a:effectLst>
+                <a:solidFill>
+                  <a:schemeClr val="bg1"/>
+                </a:solidFill>
               </a:rPr>
-              <a:t>Databases:</a:t>
+              <a:t>bases</a:t>
             </a:r>
             <a:endParaRPr lang="en-US" sz="5400" b="1" dirty="0">
-              <a:ln w="9525">
-                <a:solidFill>
-                  <a:schemeClr val="bg1"/>
-                </a:solidFill>
-                <a:prstDash val="solid"/>
-              </a:ln>
               <a:solidFill>
-                <a:schemeClr val="accent5"/>
+                <a:schemeClr val="bg1"/>
               </a:solidFill>
-              <a:effectLst>
-                <a:outerShdw blurRad="12700" dist="38100" dir="2700000" algn="tl" rotWithShape="0">
-                  <a:schemeClr val="accent5">
-                    <a:lumMod val="60000"/>
-                    <a:lumOff val="40000"/>
-                  </a:schemeClr>
-                </a:outerShdw>
-              </a:effectLst>
             </a:endParaRPr>
           </a:p>
         </p:txBody>
@@ -6180,7 +6101,7 @@
 </p:sld>
 </file>
 
-<file path=ppt/slides/slide5.xml><?xml version="1.0" encoding="utf-8"?>
+<file path=ppt/slides/slide4.xml><?xml version="1.0" encoding="utf-8"?>
 <p:sld xmlns:a="http://schemas.openxmlformats.org/drawingml/2006/main" xmlns:r="http://schemas.openxmlformats.org/officeDocument/2006/relationships" xmlns:p="http://schemas.openxmlformats.org/presentationml/2006/main">
   <p:cSld>
     <p:spTree>
@@ -6219,10 +6140,10 @@
           <a:p>
             <a:pPr algn="ctr"/>
             <a:r>
-              <a:rPr lang="en-US" dirty="0" smtClean="0"/>
+              <a:rPr lang="en-US" b="1" dirty="0" smtClean="0"/>
               <a:t>Databases Types and Popularity Trends</a:t>
             </a:r>
-            <a:endParaRPr lang="en-US" dirty="0"/>
+            <a:endParaRPr lang="en-US" b="1" dirty="0"/>
           </a:p>
         </p:txBody>
       </p:sp>
@@ -6278,6 +6199,133 @@
 </p:sld>
 </file>
 
+<file path=ppt/slides/slide5.xml><?xml version="1.0" encoding="utf-8"?>
+<p:sld xmlns:a="http://schemas.openxmlformats.org/drawingml/2006/main" xmlns:r="http://schemas.openxmlformats.org/officeDocument/2006/relationships" xmlns:p="http://schemas.openxmlformats.org/presentationml/2006/main">
+  <p:cSld>
+    <p:spTree>
+      <p:nvGrpSpPr>
+        <p:cNvPr id="1" name=""/>
+        <p:cNvGrpSpPr/>
+        <p:nvPr/>
+      </p:nvGrpSpPr>
+      <p:grpSpPr>
+        <a:xfrm>
+          <a:off x="0" y="0"/>
+          <a:ext cx="0" cy="0"/>
+          <a:chOff x="0" y="0"/>
+          <a:chExt cx="0" cy="0"/>
+        </a:xfrm>
+      </p:grpSpPr>
+      <p:sp>
+        <p:nvSpPr>
+          <p:cNvPr id="2" name="Title 1"/>
+          <p:cNvSpPr>
+            <a:spLocks noGrp="1"/>
+          </p:cNvSpPr>
+          <p:nvPr>
+            <p:ph type="title"/>
+          </p:nvPr>
+        </p:nvSpPr>
+        <p:spPr/>
+        <p:txBody>
+          <a:bodyPr>
+            <a:normAutofit/>
+          </a:bodyPr>
+          <a:lstStyle/>
+          <a:p>
+            <a:pPr algn="ctr"/>
+            <a:r>
+              <a:rPr lang="en-US" sz="4000" b="1" dirty="0" smtClean="0"/>
+              <a:t>Creating a Simple Node.js server</a:t>
+            </a:r>
+            <a:endParaRPr lang="en-US" sz="4000" b="1" dirty="0"/>
+          </a:p>
+        </p:txBody>
+      </p:sp>
+      <p:pic>
+        <p:nvPicPr>
+          <p:cNvPr id="7" name="Content Placeholder 6"/>
+          <p:cNvPicPr>
+            <a:picLocks noGrp="1" noChangeAspect="1"/>
+          </p:cNvPicPr>
+          <p:nvPr>
+            <p:ph idx="1"/>
+          </p:nvPr>
+        </p:nvPicPr>
+        <p:blipFill>
+          <a:blip r:embed="rId2">
+            <a:extLst>
+              <a:ext uri="{28A0092B-C50C-407E-A947-70E740481C1C}">
+                <a14:useLocalDpi xmlns:a14="http://schemas.microsoft.com/office/drawing/2010/main" val="0"/>
+              </a:ext>
+            </a:extLst>
+          </a:blip>
+          <a:stretch>
+            <a:fillRect/>
+          </a:stretch>
+        </p:blipFill>
+        <p:spPr>
+          <a:xfrm>
+            <a:off x="2776676" y="2514600"/>
+            <a:ext cx="6635469" cy="3124200"/>
+          </a:xfrm>
+        </p:spPr>
+      </p:pic>
+      <p:sp>
+        <p:nvSpPr>
+          <p:cNvPr id="8" name="TextBox 7"/>
+          <p:cNvSpPr txBox="1"/>
+          <p:nvPr/>
+        </p:nvSpPr>
+        <p:spPr>
+          <a:xfrm>
+            <a:off x="4957722" y="5943600"/>
+            <a:ext cx="2273379" cy="369332"/>
+          </a:xfrm>
+          <a:prstGeom prst="rect">
+            <a:avLst/>
+          </a:prstGeom>
+          <a:noFill/>
+        </p:spPr>
+        <p:txBody>
+          <a:bodyPr wrap="none" rtlCol="0">
+            <a:spAutoFit/>
+          </a:bodyPr>
+          <a:lstStyle/>
+          <a:p>
+            <a:r>
+              <a:rPr lang="en-US" dirty="0">
+                <a:hlinkClick r:id="rId3"/>
+              </a:rPr>
+              <a:t>https://nodejs.org/</a:t>
+            </a:r>
+            <a:endParaRPr lang="en-US" dirty="0"/>
+          </a:p>
+        </p:txBody>
+      </p:sp>
+    </p:spTree>
+    <p:extLst>
+      <p:ext uri="{BB962C8B-B14F-4D97-AF65-F5344CB8AC3E}">
+        <p14:creationId xmlns:p14="http://schemas.microsoft.com/office/powerpoint/2010/main" val="3979627185"/>
+      </p:ext>
+    </p:extLst>
+  </p:cSld>
+  <p:clrMapOvr>
+    <a:masterClrMapping/>
+  </p:clrMapOvr>
+  <p:transition spd="med">
+    <p:pull/>
+  </p:transition>
+  <p:timing>
+    <p:tnLst>
+      <p:par>
+        <p:cTn id="1" dur="indefinite" restart="never" nodeType="tmRoot"/>
+      </p:par>
+    </p:tnLst>
+  </p:timing>
+</p:sld>
+</file>
+
 <file path=ppt/slides/slide6.xml><?xml version="1.0" encoding="utf-8"?>
 <p:sld xmlns:a="http://schemas.openxmlformats.org/drawingml/2006/main" xmlns:r="http://schemas.openxmlformats.org/officeDocument/2006/relationships" xmlns:p="http://schemas.openxmlformats.org/presentationml/2006/main">
   <p:cSld>
@@ -6307,29 +6355,79 @@
         </p:nvSpPr>
         <p:spPr/>
         <p:txBody>
-          <a:bodyPr/>
-          <a:lstStyle/>
-          <a:p>
-            <a:endParaRPr lang="en-US"/>
-          </a:p>
-        </p:txBody>
-      </p:sp>
-      <p:sp>
-        <p:nvSpPr>
-          <p:cNvPr id="3" name="Content Placeholder 2"/>
-          <p:cNvSpPr>
-            <a:spLocks noGrp="1"/>
-          </p:cNvSpPr>
+          <a:bodyPr>
+            <a:normAutofit/>
+          </a:bodyPr>
+          <a:lstStyle/>
+          <a:p>
+            <a:pPr algn="ctr"/>
+            <a:r>
+              <a:rPr lang="en-US" sz="5400" b="1" dirty="0" smtClean="0"/>
+              <a:t>Mongoose</a:t>
+            </a:r>
+            <a:endParaRPr lang="en-US" sz="5400" b="1" dirty="0"/>
+          </a:p>
+        </p:txBody>
+      </p:sp>
+      <p:pic>
+        <p:nvPicPr>
+          <p:cNvPr id="4" name="Content Placeholder 3"/>
+          <p:cNvPicPr>
+            <a:picLocks noGrp="1" noChangeAspect="1"/>
+          </p:cNvPicPr>
           <p:nvPr>
             <p:ph idx="1"/>
           </p:nvPr>
-        </p:nvSpPr>
-        <p:spPr/>
-        <p:txBody>
-          <a:bodyPr/>
-          <a:lstStyle/>
-          <a:p>
-            <a:endParaRPr lang="en-US"/>
+        </p:nvPicPr>
+        <p:blipFill>
+          <a:blip r:embed="rId2">
+            <a:extLst>
+              <a:ext uri="{28A0092B-C50C-407E-A947-70E740481C1C}">
+                <a14:useLocalDpi xmlns:a14="http://schemas.microsoft.com/office/drawing/2010/main" val="0"/>
+              </a:ext>
+            </a:extLst>
+          </a:blip>
+          <a:stretch>
+            <a:fillRect/>
+          </a:stretch>
+        </p:blipFill>
+        <p:spPr>
+          <a:xfrm>
+            <a:off x="4011612" y="2514600"/>
+            <a:ext cx="4165600" cy="3124200"/>
+          </a:xfrm>
+        </p:spPr>
+      </p:pic>
+      <p:sp>
+        <p:nvSpPr>
+          <p:cNvPr id="5" name="TextBox 4"/>
+          <p:cNvSpPr txBox="1"/>
+          <p:nvPr/>
+        </p:nvSpPr>
+        <p:spPr>
+          <a:xfrm>
+            <a:off x="2587814" y="6082018"/>
+            <a:ext cx="7013196" cy="369332"/>
+          </a:xfrm>
+          <a:prstGeom prst="rect">
+            <a:avLst/>
+          </a:prstGeom>
+          <a:noFill/>
+        </p:spPr>
+        <p:txBody>
+          <a:bodyPr wrap="square" rtlCol="0">
+            <a:spAutoFit/>
+          </a:bodyPr>
+          <a:lstStyle/>
+          <a:p>
+            <a:pPr algn="ctr"/>
+            <a:r>
+              <a:rPr lang="en-US" dirty="0">
+                <a:hlinkClick r:id="rId3"/>
+              </a:rPr>
+              <a:t>https://mongoosejs.com/</a:t>
+            </a:r>
+            <a:endParaRPr lang="en-US" dirty="0"/>
           </a:p>
         </p:txBody>
       </p:sp>
@@ -6343,6 +6441,9 @@
   <p:clrMapOvr>
     <a:masterClrMapping/>
   </p:clrMapOvr>
+  <p:transition spd="med">
+    <p:pull/>
+  </p:transition>
   <p:timing>
     <p:tnLst>
       <p:par>
@@ -6380,6 +6481,260 @@
             <p:ph type="title"/>
           </p:nvPr>
         </p:nvSpPr>
+        <p:spPr/>
+        <p:txBody>
+          <a:bodyPr>
+            <a:normAutofit/>
+          </a:bodyPr>
+          <a:lstStyle/>
+          <a:p>
+            <a:pPr algn="ctr"/>
+            <a:r>
+              <a:rPr lang="en-US" sz="5400" b="1" dirty="0" smtClean="0"/>
+              <a:t>SQLite3</a:t>
+            </a:r>
+            <a:endParaRPr lang="en-US" sz="5400" b="1" dirty="0"/>
+          </a:p>
+        </p:txBody>
+      </p:sp>
+      <p:pic>
+        <p:nvPicPr>
+          <p:cNvPr id="5" name="Content Placeholder 4"/>
+          <p:cNvPicPr>
+            <a:picLocks noGrp="1" noChangeAspect="1"/>
+          </p:cNvPicPr>
+          <p:nvPr>
+            <p:ph idx="1"/>
+          </p:nvPr>
+        </p:nvPicPr>
+        <p:blipFill>
+          <a:blip r:embed="rId2">
+            <a:extLst>
+              <a:ext uri="{28A0092B-C50C-407E-A947-70E740481C1C}">
+                <a14:useLocalDpi xmlns:a14="http://schemas.microsoft.com/office/drawing/2010/main" val="0"/>
+              </a:ext>
+            </a:extLst>
+          </a:blip>
+          <a:stretch>
+            <a:fillRect/>
+          </a:stretch>
+        </p:blipFill>
+        <p:spPr>
+          <a:xfrm>
+            <a:off x="3282346" y="2514600"/>
+            <a:ext cx="5624132" cy="2666776"/>
+          </a:xfrm>
+        </p:spPr>
+      </p:pic>
+      <p:sp>
+        <p:nvSpPr>
+          <p:cNvPr id="4" name="TextBox 3"/>
+          <p:cNvSpPr txBox="1"/>
+          <p:nvPr/>
+        </p:nvSpPr>
+        <p:spPr>
+          <a:xfrm>
+            <a:off x="3683335" y="5943599"/>
+            <a:ext cx="4822154" cy="369332"/>
+          </a:xfrm>
+          <a:prstGeom prst="rect">
+            <a:avLst/>
+          </a:prstGeom>
+          <a:noFill/>
+        </p:spPr>
+        <p:txBody>
+          <a:bodyPr wrap="none" rtlCol="0">
+            <a:spAutoFit/>
+          </a:bodyPr>
+          <a:lstStyle/>
+          <a:p>
+            <a:r>
+              <a:rPr lang="en-US" dirty="0">
+                <a:hlinkClick r:id="rId3"/>
+              </a:rPr>
+              <a:t>https://github.com/mapbox/node-sqlite3</a:t>
+            </a:r>
+            <a:endParaRPr lang="en-US" dirty="0"/>
+          </a:p>
+        </p:txBody>
+      </p:sp>
+    </p:spTree>
+    <p:extLst>
+      <p:ext uri="{BB962C8B-B14F-4D97-AF65-F5344CB8AC3E}">
+        <p14:creationId xmlns:p14="http://schemas.microsoft.com/office/powerpoint/2010/main" val="2790529263"/>
+      </p:ext>
+    </p:extLst>
+  </p:cSld>
+  <p:clrMapOvr>
+    <a:masterClrMapping/>
+  </p:clrMapOvr>
+  <p:transition spd="med">
+    <p:pull/>
+  </p:transition>
+  <p:timing>
+    <p:tnLst>
+      <p:par>
+        <p:cTn id="1" dur="indefinite" restart="never" nodeType="tmRoot"/>
+      </p:par>
+    </p:tnLst>
+  </p:timing>
+</p:sld>
+</file>
+
+<file path=ppt/slides/slide8.xml><?xml version="1.0" encoding="utf-8"?>
+<p:sld xmlns:a="http://schemas.openxmlformats.org/drawingml/2006/main" xmlns:r="http://schemas.openxmlformats.org/officeDocument/2006/relationships" xmlns:p="http://schemas.openxmlformats.org/presentationml/2006/main">
+  <p:cSld>
+    <p:spTree>
+      <p:nvGrpSpPr>
+        <p:cNvPr id="1" name=""/>
+        <p:cNvGrpSpPr/>
+        <p:nvPr/>
+      </p:nvGrpSpPr>
+      <p:grpSpPr>
+        <a:xfrm>
+          <a:off x="0" y="0"/>
+          <a:ext cx="0" cy="0"/>
+          <a:chOff x="0" y="0"/>
+          <a:chExt cx="0" cy="0"/>
+        </a:xfrm>
+      </p:grpSpPr>
+      <p:sp>
+        <p:nvSpPr>
+          <p:cNvPr id="2" name="Title 1"/>
+          <p:cNvSpPr>
+            <a:spLocks noGrp="1"/>
+          </p:cNvSpPr>
+          <p:nvPr>
+            <p:ph type="title"/>
+          </p:nvPr>
+        </p:nvSpPr>
+        <p:spPr/>
+        <p:txBody>
+          <a:bodyPr>
+            <a:normAutofit/>
+          </a:bodyPr>
+          <a:lstStyle/>
+          <a:p>
+            <a:pPr algn="ctr"/>
+            <a:r>
+              <a:rPr lang="en-US" sz="5400" b="1" dirty="0" err="1" smtClean="0"/>
+              <a:t>Sequelize</a:t>
+            </a:r>
+            <a:endParaRPr lang="en-US" sz="5400" b="1" dirty="0"/>
+          </a:p>
+        </p:txBody>
+      </p:sp>
+      <p:pic>
+        <p:nvPicPr>
+          <p:cNvPr id="5" name="Content Placeholder 4"/>
+          <p:cNvPicPr>
+            <a:picLocks noGrp="1" noChangeAspect="1"/>
+          </p:cNvPicPr>
+          <p:nvPr>
+            <p:ph idx="1"/>
+          </p:nvPr>
+        </p:nvPicPr>
+        <p:blipFill>
+          <a:blip r:embed="rId2">
+            <a:extLst>
+              <a:ext uri="{28A0092B-C50C-407E-A947-70E740481C1C}">
+                <a14:useLocalDpi xmlns:a14="http://schemas.microsoft.com/office/drawing/2010/main" val="0"/>
+              </a:ext>
+            </a:extLst>
+          </a:blip>
+          <a:stretch>
+            <a:fillRect/>
+          </a:stretch>
+        </p:blipFill>
+        <p:spPr>
+          <a:xfrm>
+            <a:off x="2946398" y="2514600"/>
+            <a:ext cx="6296025" cy="2628900"/>
+          </a:xfrm>
+        </p:spPr>
+      </p:pic>
+      <p:sp>
+        <p:nvSpPr>
+          <p:cNvPr id="4" name="TextBox 3"/>
+          <p:cNvSpPr txBox="1"/>
+          <p:nvPr/>
+        </p:nvSpPr>
+        <p:spPr>
+          <a:xfrm>
+            <a:off x="4411098" y="5943599"/>
+            <a:ext cx="3366627" cy="369332"/>
+          </a:xfrm>
+          <a:prstGeom prst="rect">
+            <a:avLst/>
+          </a:prstGeom>
+          <a:noFill/>
+        </p:spPr>
+        <p:txBody>
+          <a:bodyPr wrap="none" rtlCol="0">
+            <a:spAutoFit/>
+          </a:bodyPr>
+          <a:lstStyle/>
+          <a:p>
+            <a:r>
+              <a:rPr lang="en-US" dirty="0">
+                <a:hlinkClick r:id="rId3"/>
+              </a:rPr>
+              <a:t>http://docs.sequelizejs.com/</a:t>
+            </a:r>
+            <a:endParaRPr lang="en-US" dirty="0"/>
+          </a:p>
+        </p:txBody>
+      </p:sp>
+    </p:spTree>
+    <p:extLst>
+      <p:ext uri="{BB962C8B-B14F-4D97-AF65-F5344CB8AC3E}">
+        <p14:creationId xmlns:p14="http://schemas.microsoft.com/office/powerpoint/2010/main" val="3361372876"/>
+      </p:ext>
+    </p:extLst>
+  </p:cSld>
+  <p:clrMapOvr>
+    <a:masterClrMapping/>
+  </p:clrMapOvr>
+  <p:transition spd="med">
+    <p:pull/>
+  </p:transition>
+  <p:timing>
+    <p:tnLst>
+      <p:par>
+        <p:cTn id="1" dur="indefinite" restart="never" nodeType="tmRoot"/>
+      </p:par>
+    </p:tnLst>
+  </p:timing>
+</p:sld>
+</file>
+
+<file path=ppt/slides/slide9.xml><?xml version="1.0" encoding="utf-8"?>
+<p:sld xmlns:a="http://schemas.openxmlformats.org/drawingml/2006/main" xmlns:r="http://schemas.openxmlformats.org/officeDocument/2006/relationships" xmlns:p="http://schemas.openxmlformats.org/presentationml/2006/main">
+  <p:cSld>
+    <p:spTree>
+      <p:nvGrpSpPr>
+        <p:cNvPr id="1" name=""/>
+        <p:cNvGrpSpPr/>
+        <p:nvPr/>
+      </p:nvGrpSpPr>
+      <p:grpSpPr>
+        <a:xfrm>
+          <a:off x="0" y="0"/>
+          <a:ext cx="0" cy="0"/>
+          <a:chOff x="0" y="0"/>
+          <a:chExt cx="0" cy="0"/>
+        </a:xfrm>
+      </p:grpSpPr>
+      <p:sp>
+        <p:nvSpPr>
+          <p:cNvPr id="2" name="Title 1"/>
+          <p:cNvSpPr>
+            <a:spLocks noGrp="1"/>
+          </p:cNvSpPr>
+          <p:nvPr>
+            <p:ph type="title"/>
+          </p:nvPr>
+        </p:nvSpPr>
         <p:spPr>
           <a:xfrm>
             <a:off x="1443164" y="4802659"/>
@@ -6468,7 +6823,6 @@
               <a:rPr lang="en-US" dirty="0" smtClean="0"/>
               <a:t>Alan Wilson</a:t>
             </a:r>
-            <a:endParaRPr lang="en-US" dirty="0" smtClean="0"/>
           </a:p>
           <a:p>
             <a:pPr marL="0" indent="0" algn="ctr">
@@ -6527,7 +6881,7 @@
         </p:blipFill>
         <p:spPr>
           <a:xfrm>
-            <a:off x="4951412" y="1292227"/>
+            <a:off x="4951412" y="1226325"/>
             <a:ext cx="1517904" cy="1517904"/>
           </a:xfrm>
           <a:prstGeom prst="rect">

</xml_diff>

<commit_message>
Updated Powerpoint Slides, Added code for SQL Injection Attack
</commit_message>
<xml_diff>
--- a/Presentation.pptx
+++ b/Presentation.pptx
@@ -9,12 +9,13 @@
     <p:sldId id="257" r:id="rId3"/>
     <p:sldId id="260" r:id="rId4"/>
     <p:sldId id="261" r:id="rId5"/>
-    <p:sldId id="259" r:id="rId6"/>
-    <p:sldId id="262" r:id="rId7"/>
-    <p:sldId id="263" r:id="rId8"/>
-    <p:sldId id="265" r:id="rId9"/>
+    <p:sldId id="265" r:id="rId6"/>
+    <p:sldId id="259" r:id="rId7"/>
+    <p:sldId id="262" r:id="rId8"/>
+    <p:sldId id="263" r:id="rId9"/>
     <p:sldId id="264" r:id="rId10"/>
-    <p:sldId id="258" r:id="rId11"/>
+    <p:sldId id="266" r:id="rId11"/>
+    <p:sldId id="258" r:id="rId12"/>
   </p:sldIdLst>
   <p:sldSz cx="12192000" cy="6858000"/>
   <p:notesSz cx="6858000" cy="9144000"/>
@@ -334,7 +335,7 @@
           <a:p>
             <a:fld id="{B497CC74-6C4D-4E27-8594-834FBF3C7E8D}" type="datetimeFigureOut">
               <a:rPr lang="en-US" smtClean="0"/>
-              <a:t>11/29/2018</a:t>
+              <a:t>12/9/2018</a:t>
             </a:fld>
             <a:endParaRPr lang="en-US"/>
           </a:p>
@@ -625,7 +626,7 @@
           <a:p>
             <a:fld id="{B497CC74-6C4D-4E27-8594-834FBF3C7E8D}" type="datetimeFigureOut">
               <a:rPr lang="en-US" smtClean="0"/>
-              <a:t>11/29/2018</a:t>
+              <a:t>12/9/2018</a:t>
             </a:fld>
             <a:endParaRPr lang="en-US"/>
           </a:p>
@@ -884,7 +885,7 @@
           <a:p>
             <a:fld id="{B497CC74-6C4D-4E27-8594-834FBF3C7E8D}" type="datetimeFigureOut">
               <a:rPr lang="en-US" smtClean="0"/>
-              <a:t>11/29/2018</a:t>
+              <a:t>12/9/2018</a:t>
             </a:fld>
             <a:endParaRPr lang="en-US"/>
           </a:p>
@@ -1353,7 +1354,7 @@
           <a:p>
             <a:fld id="{B497CC74-6C4D-4E27-8594-834FBF3C7E8D}" type="datetimeFigureOut">
               <a:rPr lang="en-US" smtClean="0"/>
-              <a:t>11/29/2018</a:t>
+              <a:t>12/9/2018</a:t>
             </a:fld>
             <a:endParaRPr lang="en-US"/>
           </a:p>
@@ -1533,7 +1534,7 @@
           <a:p>
             <a:fld id="{B497CC74-6C4D-4E27-8594-834FBF3C7E8D}" type="datetimeFigureOut">
               <a:rPr lang="en-US" smtClean="0"/>
-              <a:t>11/29/2018</a:t>
+              <a:t>12/9/2018</a:t>
             </a:fld>
             <a:endParaRPr lang="en-US"/>
           </a:p>
@@ -2109,7 +2110,7 @@
           <a:p>
             <a:fld id="{B497CC74-6C4D-4E27-8594-834FBF3C7E8D}" type="datetimeFigureOut">
               <a:rPr lang="en-US" smtClean="0"/>
-              <a:t>11/29/2018</a:t>
+              <a:t>12/9/2018</a:t>
             </a:fld>
             <a:endParaRPr lang="en-US"/>
           </a:p>
@@ -2441,7 +2442,7 @@
           <a:p>
             <a:fld id="{B497CC74-6C4D-4E27-8594-834FBF3C7E8D}" type="datetimeFigureOut">
               <a:rPr lang="en-US" smtClean="0"/>
-              <a:t>11/29/2018</a:t>
+              <a:t>12/9/2018</a:t>
             </a:fld>
             <a:endParaRPr lang="en-US"/>
           </a:p>
@@ -2616,7 +2617,7 @@
           <a:p>
             <a:fld id="{B497CC74-6C4D-4E27-8594-834FBF3C7E8D}" type="datetimeFigureOut">
               <a:rPr lang="en-US" smtClean="0"/>
-              <a:t>11/29/2018</a:t>
+              <a:t>12/9/2018</a:t>
             </a:fld>
             <a:endParaRPr lang="en-US"/>
           </a:p>
@@ -2796,7 +2797,7 @@
           <a:p>
             <a:fld id="{B497CC74-6C4D-4E27-8594-834FBF3C7E8D}" type="datetimeFigureOut">
               <a:rPr lang="en-US" smtClean="0"/>
-              <a:t>11/29/2018</a:t>
+              <a:t>12/9/2018</a:t>
             </a:fld>
             <a:endParaRPr lang="en-US"/>
           </a:p>
@@ -2966,7 +2967,7 @@
           <a:p>
             <a:fld id="{B497CC74-6C4D-4E27-8594-834FBF3C7E8D}" type="datetimeFigureOut">
               <a:rPr lang="en-US" smtClean="0"/>
-              <a:t>11/29/2018</a:t>
+              <a:t>12/9/2018</a:t>
             </a:fld>
             <a:endParaRPr lang="en-US"/>
           </a:p>
@@ -3223,7 +3224,7 @@
           <a:p>
             <a:fld id="{B497CC74-6C4D-4E27-8594-834FBF3C7E8D}" type="datetimeFigureOut">
               <a:rPr lang="en-US" smtClean="0"/>
-              <a:t>11/29/2018</a:t>
+              <a:t>12/9/2018</a:t>
             </a:fld>
             <a:endParaRPr lang="en-US"/>
           </a:p>
@@ -3515,7 +3516,7 @@
           <a:p>
             <a:fld id="{B497CC74-6C4D-4E27-8594-834FBF3C7E8D}" type="datetimeFigureOut">
               <a:rPr lang="en-US" smtClean="0"/>
-              <a:t>11/29/2018</a:t>
+              <a:t>12/9/2018</a:t>
             </a:fld>
             <a:endParaRPr lang="en-US"/>
           </a:p>
@@ -3945,7 +3946,7 @@
           <a:p>
             <a:fld id="{B497CC74-6C4D-4E27-8594-834FBF3C7E8D}" type="datetimeFigureOut">
               <a:rPr lang="en-US" smtClean="0"/>
-              <a:t>11/29/2018</a:t>
+              <a:t>12/9/2018</a:t>
             </a:fld>
             <a:endParaRPr lang="en-US"/>
           </a:p>
@@ -4063,7 +4064,7 @@
           <a:p>
             <a:fld id="{B497CC74-6C4D-4E27-8594-834FBF3C7E8D}" type="datetimeFigureOut">
               <a:rPr lang="en-US" smtClean="0"/>
-              <a:t>11/29/2018</a:t>
+              <a:t>12/9/2018</a:t>
             </a:fld>
             <a:endParaRPr lang="en-US"/>
           </a:p>
@@ -4158,7 +4159,7 @@
           <a:p>
             <a:fld id="{B497CC74-6C4D-4E27-8594-834FBF3C7E8D}" type="datetimeFigureOut">
               <a:rPr lang="en-US" smtClean="0"/>
-              <a:t>11/29/2018</a:t>
+              <a:t>12/9/2018</a:t>
             </a:fld>
             <a:endParaRPr lang="en-US"/>
           </a:p>
@@ -4441,7 +4442,7 @@
           <a:p>
             <a:fld id="{B497CC74-6C4D-4E27-8594-834FBF3C7E8D}" type="datetimeFigureOut">
               <a:rPr lang="en-US" smtClean="0"/>
-              <a:t>11/29/2018</a:t>
+              <a:t>12/9/2018</a:t>
             </a:fld>
             <a:endParaRPr lang="en-US"/>
           </a:p>
@@ -4732,7 +4733,7 @@
           <a:p>
             <a:fld id="{B497CC74-6C4D-4E27-8594-834FBF3C7E8D}" type="datetimeFigureOut">
               <a:rPr lang="en-US" smtClean="0"/>
-              <a:t>11/29/2018</a:t>
+              <a:t>12/9/2018</a:t>
             </a:fld>
             <a:endParaRPr lang="en-US"/>
           </a:p>
@@ -4963,7 +4964,7 @@
           <a:p>
             <a:fld id="{B497CC74-6C4D-4E27-8594-834FBF3C7E8D}" type="datetimeFigureOut">
               <a:rPr lang="en-US" smtClean="0"/>
-              <a:t>11/29/2018</a:t>
+              <a:t>12/9/2018</a:t>
             </a:fld>
             <a:endParaRPr lang="en-US"/>
           </a:p>
@@ -5876,6 +5877,89 @@
             <p:ph type="title"/>
           </p:nvPr>
         </p:nvSpPr>
+        <p:spPr/>
+        <p:txBody>
+          <a:bodyPr/>
+          <a:lstStyle/>
+          <a:p>
+            <a:pPr algn="ctr"/>
+            <a:r>
+              <a:rPr lang="en-US" dirty="0" smtClean="0"/>
+              <a:t>With Great Power, Comes Great Responsibility</a:t>
+            </a:r>
+            <a:endParaRPr lang="en-US" dirty="0"/>
+          </a:p>
+        </p:txBody>
+      </p:sp>
+      <p:pic>
+        <p:nvPicPr>
+          <p:cNvPr id="4" name="Content Placeholder 3"/>
+          <p:cNvPicPr>
+            <a:picLocks noGrp="1" noChangeAspect="1"/>
+          </p:cNvPicPr>
+          <p:nvPr>
+            <p:ph idx="1"/>
+          </p:nvPr>
+        </p:nvPicPr>
+        <p:blipFill>
+          <a:blip r:embed="rId2">
+            <a:extLst>
+              <a:ext uri="{28A0092B-C50C-407E-A947-70E740481C1C}">
+                <a14:useLocalDpi xmlns:a14="http://schemas.microsoft.com/office/drawing/2010/main" val="0"/>
+              </a:ext>
+            </a:extLst>
+          </a:blip>
+          <a:stretch>
+            <a:fillRect/>
+          </a:stretch>
+        </p:blipFill>
+        <p:spPr>
+          <a:xfrm>
+            <a:off x="2922588" y="3252787"/>
+            <a:ext cx="6343650" cy="1952625"/>
+          </a:xfrm>
+        </p:spPr>
+      </p:pic>
+    </p:spTree>
+    <p:extLst>
+      <p:ext uri="{BB962C8B-B14F-4D97-AF65-F5344CB8AC3E}">
+        <p14:creationId xmlns:p14="http://schemas.microsoft.com/office/powerpoint/2010/main" val="1053232506"/>
+      </p:ext>
+    </p:extLst>
+  </p:cSld>
+  <p:clrMapOvr>
+    <a:masterClrMapping/>
+  </p:clrMapOvr>
+</p:sld>
+</file>
+
+<file path=ppt/slides/slide11.xml><?xml version="1.0" encoding="utf-8"?>
+<p:sld xmlns:a="http://schemas.openxmlformats.org/drawingml/2006/main" xmlns:r="http://schemas.openxmlformats.org/officeDocument/2006/relationships" xmlns:p="http://schemas.openxmlformats.org/presentationml/2006/main">
+  <p:cSld>
+    <p:spTree>
+      <p:nvGrpSpPr>
+        <p:cNvPr id="1" name=""/>
+        <p:cNvGrpSpPr/>
+        <p:nvPr/>
+      </p:nvGrpSpPr>
+      <p:grpSpPr>
+        <a:xfrm>
+          <a:off x="0" y="0"/>
+          <a:ext cx="0" cy="0"/>
+          <a:chOff x="0" y="0"/>
+          <a:chExt cx="0" cy="0"/>
+        </a:xfrm>
+      </p:grpSpPr>
+      <p:sp>
+        <p:nvSpPr>
+          <p:cNvPr id="2" name="Title 1"/>
+          <p:cNvSpPr>
+            <a:spLocks noGrp="1"/>
+          </p:cNvSpPr>
+          <p:nvPr>
+            <p:ph type="title"/>
+          </p:nvPr>
+        </p:nvSpPr>
         <p:spPr>
           <a:xfrm>
             <a:off x="1443164" y="4802659"/>
@@ -6104,7 +6188,12 @@
             <p:ph idx="1"/>
           </p:nvPr>
         </p:nvSpPr>
-        <p:spPr/>
+        <p:spPr>
+          <a:xfrm>
+            <a:off x="1141413" y="2279821"/>
+            <a:ext cx="9905998" cy="3857369"/>
+          </a:xfrm>
+        </p:spPr>
         <p:txBody>
           <a:bodyPr/>
           <a:lstStyle/>
@@ -6161,6 +6250,18 @@
             <a:r>
               <a:rPr lang="en-US" dirty="0" smtClean="0"/>
               <a:t>??</a:t>
+            </a:r>
+          </a:p>
+          <a:p>
+            <a:r>
+              <a:rPr lang="en-US" dirty="0"/>
+              <a:t>Follow Along at: </a:t>
+            </a:r>
+            <a:r>
+              <a:rPr lang="en-US" dirty="0">
+                <a:hlinkClick r:id="rId2"/>
+              </a:rPr>
+              <a:t>https://github.com/NannerFox/Javascript-Talk</a:t>
             </a:r>
             <a:endParaRPr lang="en-US" dirty="0"/>
           </a:p>
@@ -6427,6 +6528,94 @@
             <p:ph type="title"/>
           </p:nvPr>
         </p:nvSpPr>
+        <p:spPr>
+          <a:xfrm>
+            <a:off x="1141413" y="609600"/>
+            <a:ext cx="9905998" cy="1041918"/>
+          </a:xfrm>
+        </p:spPr>
+        <p:txBody>
+          <a:bodyPr/>
+          <a:lstStyle/>
+          <a:p>
+            <a:pPr algn="ctr"/>
+            <a:r>
+              <a:rPr lang="en-US" dirty="0" smtClean="0"/>
+              <a:t>Sample SQLite Database</a:t>
+            </a:r>
+            <a:endParaRPr lang="en-US" dirty="0"/>
+          </a:p>
+        </p:txBody>
+      </p:sp>
+      <p:pic>
+        <p:nvPicPr>
+          <p:cNvPr id="4" name="Content Placeholder 3"/>
+          <p:cNvPicPr>
+            <a:picLocks noGrp="1" noChangeAspect="1"/>
+          </p:cNvPicPr>
+          <p:nvPr>
+            <p:ph idx="1"/>
+          </p:nvPr>
+        </p:nvPicPr>
+        <p:blipFill>
+          <a:blip r:embed="rId2">
+            <a:extLst>
+              <a:ext uri="{28A0092B-C50C-407E-A947-70E740481C1C}">
+                <a14:useLocalDpi xmlns:a14="http://schemas.microsoft.com/office/drawing/2010/main" val="0"/>
+              </a:ext>
+            </a:extLst>
+          </a:blip>
+          <a:stretch>
+            <a:fillRect/>
+          </a:stretch>
+        </p:blipFill>
+        <p:spPr>
+          <a:xfrm>
+            <a:off x="2284412" y="1651518"/>
+            <a:ext cx="7620000" cy="3829050"/>
+          </a:xfrm>
+        </p:spPr>
+      </p:pic>
+    </p:spTree>
+    <p:extLst>
+      <p:ext uri="{BB962C8B-B14F-4D97-AF65-F5344CB8AC3E}">
+        <p14:creationId xmlns:p14="http://schemas.microsoft.com/office/powerpoint/2010/main" val="1248444511"/>
+      </p:ext>
+    </p:extLst>
+  </p:cSld>
+  <p:clrMapOvr>
+    <a:masterClrMapping/>
+  </p:clrMapOvr>
+</p:sld>
+</file>
+
+<file path=ppt/slides/slide6.xml><?xml version="1.0" encoding="utf-8"?>
+<p:sld xmlns:a="http://schemas.openxmlformats.org/drawingml/2006/main" xmlns:r="http://schemas.openxmlformats.org/officeDocument/2006/relationships" xmlns:p="http://schemas.openxmlformats.org/presentationml/2006/main">
+  <p:cSld>
+    <p:spTree>
+      <p:nvGrpSpPr>
+        <p:cNvPr id="1" name=""/>
+        <p:cNvGrpSpPr/>
+        <p:nvPr/>
+      </p:nvGrpSpPr>
+      <p:grpSpPr>
+        <a:xfrm>
+          <a:off x="0" y="0"/>
+          <a:ext cx="0" cy="0"/>
+          <a:chOff x="0" y="0"/>
+          <a:chExt cx="0" cy="0"/>
+        </a:xfrm>
+      </p:grpSpPr>
+      <p:sp>
+        <p:nvSpPr>
+          <p:cNvPr id="2" name="Title 1"/>
+          <p:cNvSpPr>
+            <a:spLocks noGrp="1"/>
+          </p:cNvSpPr>
+          <p:nvPr>
+            <p:ph type="title"/>
+          </p:nvPr>
+        </p:nvSpPr>
         <p:spPr/>
         <p:txBody>
           <a:bodyPr>
@@ -6508,134 +6697,6 @@
     <p:extLst>
       <p:ext uri="{BB962C8B-B14F-4D97-AF65-F5344CB8AC3E}">
         <p14:creationId xmlns:p14="http://schemas.microsoft.com/office/powerpoint/2010/main" val="3979627185"/>
-      </p:ext>
-    </p:extLst>
-  </p:cSld>
-  <p:clrMapOvr>
-    <a:masterClrMapping/>
-  </p:clrMapOvr>
-  <p:transition spd="med">
-    <p:pull/>
-  </p:transition>
-  <p:timing>
-    <p:tnLst>
-      <p:par>
-        <p:cTn id="1" dur="indefinite" restart="never" nodeType="tmRoot"/>
-      </p:par>
-    </p:tnLst>
-  </p:timing>
-</p:sld>
-</file>
-
-<file path=ppt/slides/slide6.xml><?xml version="1.0" encoding="utf-8"?>
-<p:sld xmlns:a="http://schemas.openxmlformats.org/drawingml/2006/main" xmlns:r="http://schemas.openxmlformats.org/officeDocument/2006/relationships" xmlns:p="http://schemas.openxmlformats.org/presentationml/2006/main">
-  <p:cSld>
-    <p:spTree>
-      <p:nvGrpSpPr>
-        <p:cNvPr id="1" name=""/>
-        <p:cNvGrpSpPr/>
-        <p:nvPr/>
-      </p:nvGrpSpPr>
-      <p:grpSpPr>
-        <a:xfrm>
-          <a:off x="0" y="0"/>
-          <a:ext cx="0" cy="0"/>
-          <a:chOff x="0" y="0"/>
-          <a:chExt cx="0" cy="0"/>
-        </a:xfrm>
-      </p:grpSpPr>
-      <p:sp>
-        <p:nvSpPr>
-          <p:cNvPr id="2" name="Title 1"/>
-          <p:cNvSpPr>
-            <a:spLocks noGrp="1"/>
-          </p:cNvSpPr>
-          <p:nvPr>
-            <p:ph type="title"/>
-          </p:nvPr>
-        </p:nvSpPr>
-        <p:spPr/>
-        <p:txBody>
-          <a:bodyPr>
-            <a:normAutofit/>
-          </a:bodyPr>
-          <a:lstStyle/>
-          <a:p>
-            <a:pPr algn="ctr"/>
-            <a:r>
-              <a:rPr lang="en-US" sz="5400" b="1" dirty="0" smtClean="0"/>
-              <a:t>Mongoose</a:t>
-            </a:r>
-            <a:endParaRPr lang="en-US" sz="5400" b="1" dirty="0"/>
-          </a:p>
-        </p:txBody>
-      </p:sp>
-      <p:pic>
-        <p:nvPicPr>
-          <p:cNvPr id="4" name="Content Placeholder 3"/>
-          <p:cNvPicPr>
-            <a:picLocks noGrp="1" noChangeAspect="1"/>
-          </p:cNvPicPr>
-          <p:nvPr>
-            <p:ph idx="1"/>
-          </p:nvPr>
-        </p:nvPicPr>
-        <p:blipFill>
-          <a:blip r:embed="rId2">
-            <a:extLst>
-              <a:ext uri="{28A0092B-C50C-407E-A947-70E740481C1C}">
-                <a14:useLocalDpi xmlns:a14="http://schemas.microsoft.com/office/drawing/2010/main" val="0"/>
-              </a:ext>
-            </a:extLst>
-          </a:blip>
-          <a:stretch>
-            <a:fillRect/>
-          </a:stretch>
-        </p:blipFill>
-        <p:spPr>
-          <a:xfrm>
-            <a:off x="4011612" y="2514600"/>
-            <a:ext cx="4165600" cy="3124200"/>
-          </a:xfrm>
-        </p:spPr>
-      </p:pic>
-      <p:sp>
-        <p:nvSpPr>
-          <p:cNvPr id="5" name="TextBox 4"/>
-          <p:cNvSpPr txBox="1"/>
-          <p:nvPr/>
-        </p:nvSpPr>
-        <p:spPr>
-          <a:xfrm>
-            <a:off x="2587814" y="6082018"/>
-            <a:ext cx="7013196" cy="369332"/>
-          </a:xfrm>
-          <a:prstGeom prst="rect">
-            <a:avLst/>
-          </a:prstGeom>
-          <a:noFill/>
-        </p:spPr>
-        <p:txBody>
-          <a:bodyPr wrap="square" rtlCol="0">
-            <a:spAutoFit/>
-          </a:bodyPr>
-          <a:lstStyle/>
-          <a:p>
-            <a:pPr algn="ctr"/>
-            <a:r>
-              <a:rPr lang="en-US" dirty="0">
-                <a:hlinkClick r:id="rId3"/>
-              </a:rPr>
-              <a:t>https://mongoosejs.com/</a:t>
-            </a:r>
-            <a:endParaRPr lang="en-US" dirty="0"/>
-          </a:p>
-        </p:txBody>
-      </p:sp>
-    </p:spTree>
-    <p:extLst>
-      <p:ext uri="{BB962C8B-B14F-4D97-AF65-F5344CB8AC3E}">
-        <p14:creationId xmlns:p14="http://schemas.microsoft.com/office/powerpoint/2010/main" val="4177263277"/>
       </p:ext>
     </p:extLst>
   </p:cSld>
@@ -6692,7 +6753,7 @@
             <a:pPr algn="ctr"/>
             <a:r>
               <a:rPr lang="en-US" sz="5400" b="1" dirty="0" smtClean="0"/>
-              <a:t>SQLite3</a:t>
+              <a:t>Mongoose</a:t>
             </a:r>
             <a:endParaRPr lang="en-US" sz="5400" b="1" dirty="0"/>
           </a:p>
@@ -6700,7 +6761,7 @@
       </p:sp>
       <p:pic>
         <p:nvPicPr>
-          <p:cNvPr id="5" name="Content Placeholder 4"/>
+          <p:cNvPr id="4" name="Content Placeholder 3"/>
           <p:cNvPicPr>
             <a:picLocks noGrp="1" noChangeAspect="1"/>
           </p:cNvPicPr>
@@ -6722,21 +6783,21 @@
         </p:blipFill>
         <p:spPr>
           <a:xfrm>
-            <a:off x="3282346" y="2514600"/>
-            <a:ext cx="5624132" cy="2666776"/>
+            <a:off x="4011612" y="2514600"/>
+            <a:ext cx="4165600" cy="3124200"/>
           </a:xfrm>
         </p:spPr>
       </p:pic>
       <p:sp>
         <p:nvSpPr>
-          <p:cNvPr id="4" name="TextBox 3"/>
+          <p:cNvPr id="5" name="TextBox 4"/>
           <p:cNvSpPr txBox="1"/>
           <p:nvPr/>
         </p:nvSpPr>
         <p:spPr>
           <a:xfrm>
-            <a:off x="3683335" y="5943599"/>
-            <a:ext cx="4822154" cy="369332"/>
+            <a:off x="2587814" y="6082018"/>
+            <a:ext cx="7013196" cy="369332"/>
           </a:xfrm>
           <a:prstGeom prst="rect">
             <a:avLst/>
@@ -6744,16 +6805,17 @@
           <a:noFill/>
         </p:spPr>
         <p:txBody>
-          <a:bodyPr wrap="none" rtlCol="0">
+          <a:bodyPr wrap="square" rtlCol="0">
             <a:spAutoFit/>
           </a:bodyPr>
           <a:lstStyle/>
           <a:p>
+            <a:pPr algn="ctr"/>
             <a:r>
               <a:rPr lang="en-US" dirty="0">
                 <a:hlinkClick r:id="rId3"/>
               </a:rPr>
-              <a:t>https://github.com/mapbox/node-sqlite3</a:t>
+              <a:t>https://mongoosejs.com/</a:t>
             </a:r>
             <a:endParaRPr lang="en-US" dirty="0"/>
           </a:p>
@@ -6762,7 +6824,7 @@
     </p:spTree>
     <p:extLst>
       <p:ext uri="{BB962C8B-B14F-4D97-AF65-F5344CB8AC3E}">
-        <p14:creationId xmlns:p14="http://schemas.microsoft.com/office/powerpoint/2010/main" val="2790529263"/>
+        <p14:creationId xmlns:p14="http://schemas.microsoft.com/office/powerpoint/2010/main" val="4177263277"/>
       </p:ext>
     </p:extLst>
   </p:cSld>
@@ -6809,28 +6871,25 @@
             <p:ph type="title"/>
           </p:nvPr>
         </p:nvSpPr>
-        <p:spPr>
-          <a:xfrm>
-            <a:off x="1141413" y="609600"/>
-            <a:ext cx="9905998" cy="1041918"/>
-          </a:xfrm>
-        </p:spPr>
-        <p:txBody>
-          <a:bodyPr/>
+        <p:spPr/>
+        <p:txBody>
+          <a:bodyPr>
+            <a:normAutofit/>
+          </a:bodyPr>
           <a:lstStyle/>
           <a:p>
             <a:pPr algn="ctr"/>
             <a:r>
-              <a:rPr lang="en-US" dirty="0" smtClean="0"/>
-              <a:t>Sample SQLite Database</a:t>
-            </a:r>
-            <a:endParaRPr lang="en-US" dirty="0"/>
+              <a:rPr lang="en-US" sz="5400" b="1" dirty="0" smtClean="0"/>
+              <a:t>SQLite3</a:t>
+            </a:r>
+            <a:endParaRPr lang="en-US" sz="5400" b="1" dirty="0"/>
           </a:p>
         </p:txBody>
       </p:sp>
       <p:pic>
         <p:nvPicPr>
-          <p:cNvPr id="4" name="Content Placeholder 3"/>
+          <p:cNvPr id="5" name="Content Placeholder 4"/>
           <p:cNvPicPr>
             <a:picLocks noGrp="1" noChangeAspect="1"/>
           </p:cNvPicPr>
@@ -6852,21 +6911,63 @@
         </p:blipFill>
         <p:spPr>
           <a:xfrm>
-            <a:off x="2284412" y="1651518"/>
-            <a:ext cx="7620000" cy="3829050"/>
+            <a:off x="3282346" y="2514600"/>
+            <a:ext cx="5624132" cy="2666776"/>
           </a:xfrm>
         </p:spPr>
       </p:pic>
+      <p:sp>
+        <p:nvSpPr>
+          <p:cNvPr id="4" name="TextBox 3"/>
+          <p:cNvSpPr txBox="1"/>
+          <p:nvPr/>
+        </p:nvSpPr>
+        <p:spPr>
+          <a:xfrm>
+            <a:off x="3683335" y="5943599"/>
+            <a:ext cx="4822154" cy="369332"/>
+          </a:xfrm>
+          <a:prstGeom prst="rect">
+            <a:avLst/>
+          </a:prstGeom>
+          <a:noFill/>
+        </p:spPr>
+        <p:txBody>
+          <a:bodyPr wrap="none" rtlCol="0">
+            <a:spAutoFit/>
+          </a:bodyPr>
+          <a:lstStyle/>
+          <a:p>
+            <a:r>
+              <a:rPr lang="en-US" dirty="0">
+                <a:hlinkClick r:id="rId3"/>
+              </a:rPr>
+              <a:t>https://github.com/mapbox/node-sqlite3</a:t>
+            </a:r>
+            <a:endParaRPr lang="en-US" dirty="0"/>
+          </a:p>
+        </p:txBody>
+      </p:sp>
     </p:spTree>
     <p:extLst>
       <p:ext uri="{BB962C8B-B14F-4D97-AF65-F5344CB8AC3E}">
-        <p14:creationId xmlns:p14="http://schemas.microsoft.com/office/powerpoint/2010/main" val="1248444511"/>
+        <p14:creationId xmlns:p14="http://schemas.microsoft.com/office/powerpoint/2010/main" val="2790529263"/>
       </p:ext>
     </p:extLst>
   </p:cSld>
   <p:clrMapOvr>
     <a:masterClrMapping/>
   </p:clrMapOvr>
+  <p:transition spd="med">
+    <p:pull/>
+  </p:transition>
+  <p:timing>
+    <p:tnLst>
+      <p:par>
+        <p:cTn id="1" dur="indefinite" restart="never" nodeType="tmRoot"/>
+      </p:par>
+    </p:tnLst>
+  </p:timing>
 </p:sld>
 </file>
 

</xml_diff>